<commit_message>
change result pic in presentation slides
</commit_message>
<xml_diff>
--- a/Presentation.pptx
+++ b/Presentation.pptx
@@ -4640,7 +4640,7 @@
       </p:sp>
       <p:pic>
         <p:nvPicPr>
-          <p:cNvPr id="5" name="Content Placeholder 4"/>
+          <p:cNvPr id="4" name="Content Placeholder 3"/>
           <p:cNvPicPr>
             <a:picLocks noGrp="1" noChangeAspect="1"/>
           </p:cNvPicPr>
@@ -4656,8 +4656,8 @@
         </p:blipFill>
         <p:spPr>
           <a:xfrm>
-            <a:off x="838200" y="1511726"/>
-            <a:ext cx="10741590" cy="5011903"/>
+            <a:off x="682785" y="1372779"/>
+            <a:ext cx="11146100" cy="4897392"/>
           </a:xfrm>
           <a:prstGeom prst="rect">
             <a:avLst/>
@@ -5547,15 +5547,7 @@
             </a:r>
             <a:r>
               <a:rPr lang="en-US" dirty="0" smtClean="0"/>
-              <a:t>t </a:t>
-            </a:r>
-            <a:r>
-              <a:rPr lang="en-US" dirty="0" smtClean="0"/>
-              <a:t>also contains other miscellaneous info also, but normally not useful for visualization</a:t>
-            </a:r>
-            <a:r>
-              <a:rPr lang="en-US" dirty="0" smtClean="0"/>
-              <a:t>.</a:t>
+              <a:t>t also contains other miscellaneous info also, but normally not useful for visualization.</a:t>
             </a:r>
           </a:p>
           <a:p>
@@ -8239,11 +8231,11 @@
   <p:clrMapOvr>
     <a:masterClrMapping/>
   </p:clrMapOvr>
-  <mc:AlternateContent xmlns:mc="http://schemas.openxmlformats.org/markup-compatibility/2006">
-    <mc:Choice xmlns:p14="http://schemas.microsoft.com/office/powerpoint/2010/main" Requires="p14">
+  <mc:AlternateContent xmlns:mc="http://schemas.openxmlformats.org/markup-compatibility/2006" xmlns:p14="http://schemas.microsoft.com/office/powerpoint/2010/main">
+    <mc:Choice Requires="p14">
       <p:transition p14:dur="0"/>
     </mc:Choice>
-    <mc:Fallback>
+    <mc:Fallback xmlns="">
       <p:transition/>
     </mc:Fallback>
   </mc:AlternateContent>

</xml_diff>